<commit_message>
Update Poster image and PowerPoint files
</commit_message>
<xml_diff>
--- a/Poster.pptx
+++ b/Poster.pptx
@@ -12298,7 +12298,7 @@
         <p:spPr>
           <a:xfrm>
             <a:off x="5079999" y="367300"/>
-            <a:ext cx="51460399" cy="5278368"/>
+            <a:ext cx="51460399" cy="5355312"/>
           </a:xfrm>
           <a:prstGeom prst="rect">
             <a:avLst/>
@@ -12343,7 +12343,7 @@
               <a:defRPr/>
             </a:pPr>
             <a:r>
-              <a:rPr lang="en-US" altLang="en-US" sz="7000" dirty="0">
+              <a:rPr lang="en-US" altLang="en-US" sz="6500" dirty="0">
                 <a:solidFill>
                   <a:srgbClr val="FFFFFF"/>
                 </a:solidFill>
@@ -12365,7 +12365,7 @@
               <a:defRPr/>
             </a:pPr>
             <a:r>
-              <a:rPr lang="en-US" altLang="en-US" sz="5000" dirty="0">
+              <a:rPr lang="en-US" altLang="en-US" sz="6500" dirty="0">
                 <a:solidFill>
                   <a:srgbClr val="FFFFFF"/>
                 </a:solidFill>
@@ -12373,16 +12373,8 @@
                 <a:ea typeface="Inter" panose="02000503000000020004" pitchFamily="2" charset="0"/>
                 <a:cs typeface="Arial" panose="020B0604020202020204" pitchFamily="34" charset="0"/>
               </a:rPr>
-              <a:t> Zayd Krunz</a:t>
+              <a:t>Zayd Krunz</a:t>
             </a:r>
-            <a:endParaRPr lang="en-US" altLang="en-US" sz="4400" dirty="0">
-              <a:solidFill>
-                <a:srgbClr val="FFFFFF"/>
-              </a:solidFill>
-              <a:latin typeface="Arial" panose="020B0604020202020204" pitchFamily="34" charset="0"/>
-              <a:ea typeface="Inter" panose="02000503000000020004" pitchFamily="2" charset="0"/>
-              <a:cs typeface="Arial" panose="020B0604020202020204" pitchFamily="34" charset="0"/>
-            </a:endParaRPr>
           </a:p>
           <a:p>
             <a:pPr eaLnBrk="1" hangingPunct="1">

</xml_diff>

<commit_message>
Update Poster.png and Poster.pptx files
</commit_message>
<xml_diff>
--- a/Poster.pptx
+++ b/Poster.pptx
@@ -2694,7 +2694,7 @@
           <a:p>
             <a:fld id="{7ACADFF2-B417-41A2-8B4F-57B66A4E1ABD}" type="datetimeFigureOut">
               <a:rPr lang="en-US" smtClean="0"/>
-              <a:t>7/16/25</a:t>
+              <a:t>7/17/25</a:t>
             </a:fld>
             <a:endParaRPr lang="en-US"/>
           </a:p>
@@ -3176,7 +3176,7 @@
           <a:p>
             <a:fld id="{4DE00E4B-295B-3643-81B9-D886B240B44E}" type="datetimeFigureOut">
               <a:rPr lang="en-US" smtClean="0"/>
-              <a:t>7/16/25</a:t>
+              <a:t>7/17/25</a:t>
             </a:fld>
             <a:endParaRPr lang="en-US"/>
           </a:p>
@@ -3346,7 +3346,7 @@
           <a:p>
             <a:fld id="{4DE00E4B-295B-3643-81B9-D886B240B44E}" type="datetimeFigureOut">
               <a:rPr lang="en-US" smtClean="0"/>
-              <a:t>7/16/25</a:t>
+              <a:t>7/17/25</a:t>
             </a:fld>
             <a:endParaRPr lang="en-US"/>
           </a:p>
@@ -3526,7 +3526,7 @@
           <a:p>
             <a:fld id="{4DE00E4B-295B-3643-81B9-D886B240B44E}" type="datetimeFigureOut">
               <a:rPr lang="en-US" smtClean="0"/>
-              <a:t>7/16/25</a:t>
+              <a:t>7/17/25</a:t>
             </a:fld>
             <a:endParaRPr lang="en-US"/>
           </a:p>
@@ -4700,7 +4700,7 @@
           <a:p>
             <a:fld id="{4DE00E4B-295B-3643-81B9-D886B240B44E}" type="datetimeFigureOut">
               <a:rPr lang="en-US" smtClean="0"/>
-              <a:t>7/16/25</a:t>
+              <a:t>7/17/25</a:t>
             </a:fld>
             <a:endParaRPr lang="en-US"/>
           </a:p>
@@ -4944,7 +4944,7 @@
           <a:p>
             <a:fld id="{4DE00E4B-295B-3643-81B9-D886B240B44E}" type="datetimeFigureOut">
               <a:rPr lang="en-US" smtClean="0"/>
-              <a:t>7/16/25</a:t>
+              <a:t>7/17/25</a:t>
             </a:fld>
             <a:endParaRPr lang="en-US"/>
           </a:p>
@@ -5176,7 +5176,7 @@
           <a:p>
             <a:fld id="{4DE00E4B-295B-3643-81B9-D886B240B44E}" type="datetimeFigureOut">
               <a:rPr lang="en-US" smtClean="0"/>
-              <a:t>7/16/25</a:t>
+              <a:t>7/17/25</a:t>
             </a:fld>
             <a:endParaRPr lang="en-US"/>
           </a:p>
@@ -5543,7 +5543,7 @@
           <a:p>
             <a:fld id="{4DE00E4B-295B-3643-81B9-D886B240B44E}" type="datetimeFigureOut">
               <a:rPr lang="en-US" smtClean="0"/>
-              <a:t>7/16/25</a:t>
+              <a:t>7/17/25</a:t>
             </a:fld>
             <a:endParaRPr lang="en-US"/>
           </a:p>
@@ -5661,7 +5661,7 @@
           <a:p>
             <a:fld id="{4DE00E4B-295B-3643-81B9-D886B240B44E}" type="datetimeFigureOut">
               <a:rPr lang="en-US" smtClean="0"/>
-              <a:t>7/16/25</a:t>
+              <a:t>7/17/25</a:t>
             </a:fld>
             <a:endParaRPr lang="en-US"/>
           </a:p>
@@ -5756,7 +5756,7 @@
           <a:p>
             <a:fld id="{4DE00E4B-295B-3643-81B9-D886B240B44E}" type="datetimeFigureOut">
               <a:rPr lang="en-US" smtClean="0"/>
-              <a:t>7/16/25</a:t>
+              <a:t>7/17/25</a:t>
             </a:fld>
             <a:endParaRPr lang="en-US"/>
           </a:p>
@@ -6033,7 +6033,7 @@
           <a:p>
             <a:fld id="{4DE00E4B-295B-3643-81B9-D886B240B44E}" type="datetimeFigureOut">
               <a:rPr lang="en-US" smtClean="0"/>
-              <a:t>7/16/25</a:t>
+              <a:t>7/17/25</a:t>
             </a:fld>
             <a:endParaRPr lang="en-US"/>
           </a:p>
@@ -6290,7 +6290,7 @@
           <a:p>
             <a:fld id="{4DE00E4B-295B-3643-81B9-D886B240B44E}" type="datetimeFigureOut">
               <a:rPr lang="en-US" smtClean="0"/>
-              <a:t>7/16/25</a:t>
+              <a:t>7/17/25</a:t>
             </a:fld>
             <a:endParaRPr lang="en-US"/>
           </a:p>
@@ -6503,7 +6503,7 @@
           <a:p>
             <a:fld id="{4DE00E4B-295B-3643-81B9-D886B240B44E}" type="datetimeFigureOut">
               <a:rPr lang="en-US" smtClean="0"/>
-              <a:t>7/16/25</a:t>
+              <a:t>7/17/25</a:t>
             </a:fld>
             <a:endParaRPr lang="en-US"/>
           </a:p>
@@ -10620,7 +10620,7 @@
         <p:spPr bwMode="auto">
           <a:xfrm>
             <a:off x="565448" y="6678620"/>
-            <a:ext cx="9829800" cy="5788636"/>
+            <a:ext cx="9829800" cy="4829527"/>
           </a:xfrm>
           <a:prstGeom prst="rect">
             <a:avLst/>
@@ -10749,7 +10749,7 @@
           <a:p>
             <a:pPr>
               <a:lnSpc>
-                <a:spcPts val="4600"/>
+                <a:spcPts val="5500"/>
               </a:lnSpc>
               <a:spcAft>
                 <a:spcPts val="1200"/>
@@ -10774,11 +10774,6 @@
             </a:endParaRPr>
           </a:p>
           <a:p>
-            <a:pPr>
-              <a:lnSpc>
-                <a:spcPts val="5600"/>
-              </a:lnSpc>
-            </a:pPr>
             <a:r>
               <a:rPr lang="en-US" altLang="en-US" sz="3600" dirty="0">
                 <a:solidFill>
@@ -10808,7 +10803,7 @@
         </p:nvSpPr>
         <p:spPr>
           <a:xfrm>
-            <a:off x="409668" y="13733447"/>
+            <a:off x="360956" y="12543555"/>
             <a:ext cx="9714350" cy="11822339"/>
           </a:xfrm>
           <a:prstGeom prst="rect">
@@ -10828,9 +10823,6 @@
           <a:lstStyle/>
           <a:p>
             <a:pPr>
-              <a:lnSpc>
-                <a:spcPts val="4600"/>
-              </a:lnSpc>
               <a:spcAft>
                 <a:spcPts val="1200"/>
               </a:spcAft>
@@ -10849,9 +10841,6 @@
           </a:p>
           <a:p>
             <a:pPr>
-              <a:lnSpc>
-                <a:spcPts val="4600"/>
-              </a:lnSpc>
               <a:spcBef>
                 <a:spcPts val="0"/>
               </a:spcBef>
@@ -10902,9 +10891,6 @@
           </a:p>
           <a:p>
             <a:pPr>
-              <a:lnSpc>
-                <a:spcPts val="4600"/>
-              </a:lnSpc>
               <a:spcBef>
                 <a:spcPts val="0"/>
               </a:spcBef>
@@ -10926,9 +10912,6 @@
           </a:p>
           <a:p>
             <a:pPr marL="914400" lvl="1" indent="-457200">
-              <a:lnSpc>
-                <a:spcPts val="4600"/>
-              </a:lnSpc>
               <a:spcBef>
                 <a:spcPts val="0"/>
               </a:spcBef>
@@ -10982,9 +10965,6 @@
           </a:p>
           <a:p>
             <a:pPr>
-              <a:lnSpc>
-                <a:spcPts val="4600"/>
-              </a:lnSpc>
               <a:spcAft>
                 <a:spcPts val="1200"/>
               </a:spcAft>
@@ -11003,9 +10983,6 @@
           </a:p>
           <a:p>
             <a:pPr marL="914400" lvl="1" indent="-457200">
-              <a:lnSpc>
-                <a:spcPts val="4600"/>
-              </a:lnSpc>
               <a:spcBef>
                 <a:spcPts val="0"/>
               </a:spcBef>
@@ -11061,7 +11038,7 @@
         <p:spPr>
           <a:xfrm>
             <a:off x="10674641" y="6750327"/>
-            <a:ext cx="9912168" cy="9052350"/>
+            <a:ext cx="9912168" cy="8592096"/>
           </a:xfrm>
           <a:prstGeom prst="rect">
             <a:avLst/>
@@ -11096,14 +11073,11 @@
                 <a:latin typeface="Arial" panose="020B0604020202020204" pitchFamily="34" charset="0"/>
                 <a:cs typeface="Arial" panose="020B0604020202020204" pitchFamily="34" charset="0"/>
               </a:rPr>
-              <a:t>Data Analysis </a:t>
+              <a:t>Data Analysis &amp; Results </a:t>
             </a:r>
           </a:p>
           <a:p>
             <a:pPr>
-              <a:lnSpc>
-                <a:spcPts val="4600"/>
-              </a:lnSpc>
               <a:spcBef>
                 <a:spcPts val="0"/>
               </a:spcBef>
@@ -11207,7 +11181,7 @@
         </p:nvSpPr>
         <p:spPr>
           <a:xfrm>
-            <a:off x="32753319" y="6459222"/>
+            <a:off x="32753320" y="14669600"/>
             <a:ext cx="10792673" cy="9950032"/>
           </a:xfrm>
           <a:prstGeom prst="rect">
@@ -11227,9 +11201,6 @@
           <a:lstStyle/>
           <a:p>
             <a:pPr>
-              <a:lnSpc>
-                <a:spcPts val="4600"/>
-              </a:lnSpc>
               <a:spcAft>
                 <a:spcPts val="1200"/>
               </a:spcAft>
@@ -11243,14 +11214,11 @@
                 <a:latin typeface="Arial" panose="020B0604020202020204" pitchFamily="34" charset="0"/>
                 <a:cs typeface="Arial" panose="020B0604020202020204" pitchFamily="34" charset="0"/>
               </a:rPr>
-              <a:t>Conclusion</a:t>
+              <a:t>Conclusion &amp; Insights</a:t>
             </a:r>
           </a:p>
           <a:p>
             <a:pPr>
-              <a:lnSpc>
-                <a:spcPts val="4600"/>
-              </a:lnSpc>
               <a:spcBef>
                 <a:spcPts val="0"/>
               </a:spcBef>
@@ -11275,9 +11243,6 @@
           </a:p>
           <a:p>
             <a:pPr marL="914400" lvl="1" indent="-457200">
-              <a:lnSpc>
-                <a:spcPts val="4600"/>
-              </a:lnSpc>
               <a:spcAft>
                 <a:spcPts val="1200"/>
               </a:spcAft>
@@ -11318,9 +11283,6 @@
           </a:p>
           <a:p>
             <a:pPr marL="914400" lvl="1" indent="-457200">
-              <a:lnSpc>
-                <a:spcPts val="4600"/>
-              </a:lnSpc>
               <a:spcBef>
                 <a:spcPts val="0"/>
               </a:spcBef>
@@ -11405,7 +11367,7 @@
         <p:spPr>
           <a:xfrm>
             <a:off x="21607197" y="15707339"/>
-            <a:ext cx="9784080" cy="9283182"/>
+            <a:ext cx="9784080" cy="9156353"/>
           </a:xfrm>
           <a:prstGeom prst="rect">
             <a:avLst/>
@@ -11424,9 +11386,6 @@
           <a:lstStyle/>
           <a:p>
             <a:pPr>
-              <a:lnSpc>
-                <a:spcPts val="4600"/>
-              </a:lnSpc>
               <a:spcAft>
                 <a:spcPts val="1200"/>
               </a:spcAft>
@@ -11440,14 +11399,11 @@
                 <a:latin typeface="Arial" panose="020B0604020202020204" pitchFamily="34" charset="0"/>
                 <a:cs typeface="Arial" panose="020B0604020202020204" pitchFamily="34" charset="0"/>
               </a:rPr>
-              <a:t>Models &amp; Results</a:t>
+              <a:t>Machine Learning Results</a:t>
             </a:r>
           </a:p>
           <a:p>
             <a:pPr>
-              <a:lnSpc>
-                <a:spcPts val="4600"/>
-              </a:lnSpc>
               <a:spcBef>
                 <a:spcPts val="0"/>
               </a:spcBef>
@@ -11472,9 +11428,6 @@
           </a:p>
           <a:p>
             <a:pPr marL="914400" marR="0" lvl="1" indent="-457200" algn="l" defTabSz="457200" rtl="0" eaLnBrk="1" fontAlgn="auto" latinLnBrk="0" hangingPunct="1">
-              <a:lnSpc>
-                <a:spcPts val="4600"/>
-              </a:lnSpc>
               <a:spcBef>
                 <a:spcPts val="0"/>
               </a:spcBef>
@@ -11512,9 +11465,6 @@
           </a:p>
           <a:p>
             <a:pPr marR="0" lvl="1" algn="l" defTabSz="457200" rtl="0" eaLnBrk="1" fontAlgn="auto" latinLnBrk="0" hangingPunct="1">
-              <a:lnSpc>
-                <a:spcPts val="4600"/>
-              </a:lnSpc>
               <a:spcBef>
                 <a:spcPts val="0"/>
               </a:spcBef>
@@ -11541,9 +11491,6 @@
           </a:p>
           <a:p>
             <a:pPr marR="0" lvl="1" algn="l" defTabSz="457200" rtl="0" eaLnBrk="1" fontAlgn="auto" latinLnBrk="0" hangingPunct="1">
-              <a:lnSpc>
-                <a:spcPts val="4600"/>
-              </a:lnSpc>
               <a:spcBef>
                 <a:spcPts val="0"/>
               </a:spcBef>
@@ -11733,9 +11680,6 @@
           <a:lstStyle/>
           <a:p>
             <a:pPr>
-              <a:lnSpc>
-                <a:spcPts val="3800"/>
-              </a:lnSpc>
               <a:spcAft>
                 <a:spcPts val="1200"/>
               </a:spcAft>
@@ -11765,9 +11709,6 @@
           </a:p>
           <a:p>
             <a:pPr>
-              <a:lnSpc>
-                <a:spcPts val="3800"/>
-              </a:lnSpc>
               <a:spcBef>
                 <a:spcPts val="0"/>
               </a:spcBef>
@@ -11847,9 +11788,6 @@
           </a:p>
           <a:p>
             <a:pPr>
-              <a:lnSpc>
-                <a:spcPts val="3800"/>
-              </a:lnSpc>
               <a:buClr>
                 <a:schemeClr val="tx2"/>
               </a:buClr>
@@ -11925,9 +11863,6 @@
           </a:p>
           <a:p>
             <a:pPr>
-              <a:lnSpc>
-                <a:spcPts val="3800"/>
-              </a:lnSpc>
               <a:buClr>
                 <a:schemeClr val="tx2"/>
               </a:buClr>
@@ -12055,9 +11990,6 @@
           </a:p>
           <a:p>
             <a:pPr>
-              <a:lnSpc>
-                <a:spcPts val="3800"/>
-              </a:lnSpc>
               <a:buClr>
                 <a:schemeClr val="tx2"/>
               </a:buClr>
@@ -12194,7 +12126,7 @@
         </p:nvCxnSpPr>
         <p:spPr bwMode="auto">
           <a:xfrm>
-            <a:off x="484788" y="12947490"/>
+            <a:off x="437683" y="12133112"/>
             <a:ext cx="9589328" cy="0"/>
           </a:xfrm>
           <a:prstGeom prst="line">
@@ -12297,7 +12229,7 @@
         </p:nvSpPr>
         <p:spPr>
           <a:xfrm>
-            <a:off x="5079999" y="367300"/>
+            <a:off x="5080000" y="821123"/>
             <a:ext cx="51460399" cy="5355312"/>
           </a:xfrm>
           <a:prstGeom prst="rect">
@@ -12986,13 +12918,13 @@
           <p:nvPr>
             <p:extLst>
               <p:ext uri="{D42A27DB-BD31-4B8C-83A1-F6EECF244321}">
-                <p14:modId xmlns:p14="http://schemas.microsoft.com/office/powerpoint/2010/main" val="1152940325"/>
+                <p14:modId xmlns:p14="http://schemas.microsoft.com/office/powerpoint/2010/main" val="2432185518"/>
               </p:ext>
             </p:extLst>
           </p:nvPr>
         </p:nvGraphicFramePr>
         <p:xfrm>
-          <a:off x="442093" y="25313135"/>
+          <a:off x="394988" y="24498757"/>
           <a:ext cx="8822975" cy="7288516"/>
         </p:xfrm>
         <a:graphic>
@@ -13189,36 +13121,6 @@
       </p:sp>
       <p:pic>
         <p:nvPicPr>
-          <p:cNvPr id="6" name="Picture 5">
-            <a:extLst>
-              <a:ext uri="{FF2B5EF4-FFF2-40B4-BE49-F238E27FC236}">
-                <a16:creationId xmlns:a16="http://schemas.microsoft.com/office/drawing/2014/main" id="{4F42DD70-8A8A-0663-B8CD-F2A75EB2772F}"/>
-              </a:ext>
-            </a:extLst>
-          </p:cNvPr>
-          <p:cNvPicPr>
-            <a:picLocks noChangeAspect="1"/>
-          </p:cNvPicPr>
-          <p:nvPr/>
-        </p:nvPicPr>
-        <p:blipFill>
-          <a:blip r:embed="rId12"/>
-          <a:stretch>
-            <a:fillRect/>
-          </a:stretch>
-        </p:blipFill>
-        <p:spPr>
-          <a:xfrm>
-            <a:off x="20961350" y="15792450"/>
-            <a:ext cx="1968500" cy="1333500"/>
-          </a:xfrm>
-          <a:prstGeom prst="rect">
-            <a:avLst/>
-          </a:prstGeom>
-        </p:spPr>
-      </p:pic>
-      <p:pic>
-        <p:nvPicPr>
           <p:cNvPr id="10" name="Picture 2">
             <a:extLst>
               <a:ext uri="{FF2B5EF4-FFF2-40B4-BE49-F238E27FC236}">
@@ -13232,7 +13134,7 @@
           <p:nvPr/>
         </p:nvPicPr>
         <p:blipFill>
-          <a:blip r:embed="rId13">
+          <a:blip r:embed="rId12">
             <a:extLst>
               <a:ext uri="{28A0092B-C50C-407E-A947-70E740481C1C}">
                 <a14:useLocalDpi xmlns:a14="http://schemas.microsoft.com/office/drawing/2010/main" val="0"/>
@@ -13279,7 +13181,7 @@
           <p:nvPr/>
         </p:nvPicPr>
         <p:blipFill>
-          <a:blip r:embed="rId14"/>
+          <a:blip r:embed="rId13"/>
           <a:stretch>
             <a:fillRect/>
           </a:stretch>
@@ -13309,7 +13211,7 @@
           <p:nvPr/>
         </p:nvPicPr>
         <p:blipFill>
-          <a:blip r:embed="rId15">
+          <a:blip r:embed="rId14">
             <a:extLst>
               <a:ext uri="{28A0092B-C50C-407E-A947-70E740481C1C}">
                 <a14:useLocalDpi xmlns:a14="http://schemas.microsoft.com/office/drawing/2010/main" val="0"/>
@@ -13356,7 +13258,7 @@
           <p:nvPr/>
         </p:nvPicPr>
         <p:blipFill>
-          <a:blip r:embed="rId16">
+          <a:blip r:embed="rId15">
             <a:extLst>
               <a:ext uri="{28A0092B-C50C-407E-A947-70E740481C1C}">
                 <a14:useLocalDpi xmlns:a14="http://schemas.microsoft.com/office/drawing/2010/main" val="0"/>
@@ -13370,7 +13272,7 @@
         </p:blipFill>
         <p:spPr bwMode="auto">
           <a:xfrm>
-            <a:off x="32203653" y="16766986"/>
+            <a:off x="32222259" y="6096281"/>
             <a:ext cx="11687547" cy="7739051"/>
           </a:xfrm>
           <a:prstGeom prst="rect">

</xml_diff>

<commit_message>
Update poster files and add instructor acknowledgment to README
</commit_message>
<xml_diff>
--- a/Poster.pptx
+++ b/Poster.pptx
@@ -8507,7 +8507,7 @@
               <a:defRPr/>
             </a:pPr>
             <a:r>
-              <a:rPr lang="en-US" sz="3600">
+              <a:rPr lang="en-US" sz="3600" dirty="0" err="1">
                 <a:solidFill>
                   <a:schemeClr val="bg2">
                     <a:lumMod val="50000"/>
@@ -8517,18 +8517,21 @@
                 <a:ea typeface="SF Pro Semibold" pitchFamily="2" charset="0"/>
                 <a:cs typeface="Arial" charset="0"/>
               </a:rPr>
-              <a:t>GridSearchCV was used to tune hyperparameters for each tuned model, optimizing for recall score to prioritize the detection of true failures. The dataset was split into 80% training and 20% testing sets for robust evaluation.  </a:t>
-            </a:r>
-            <a:endParaRPr lang="en-US" sz="3600" dirty="0">
-              <a:solidFill>
-                <a:schemeClr val="bg2">
-                  <a:lumMod val="50000"/>
-                </a:schemeClr>
-              </a:solidFill>
-              <a:latin typeface="Arial" charset="0"/>
-              <a:ea typeface="SF Pro Semibold" pitchFamily="2" charset="0"/>
-              <a:cs typeface="Arial" charset="0"/>
-            </a:endParaRPr>
+              <a:t>GridSearchCV</a:t>
+            </a:r>
+            <a:r>
+              <a:rPr lang="en-US" sz="3600" dirty="0">
+                <a:solidFill>
+                  <a:schemeClr val="bg2">
+                    <a:lumMod val="50000"/>
+                  </a:schemeClr>
+                </a:solidFill>
+                <a:latin typeface="Arial" charset="0"/>
+                <a:ea typeface="SF Pro Semibold" pitchFamily="2" charset="0"/>
+                <a:cs typeface="Arial" charset="0"/>
+              </a:rPr>
+              <a:t> was used to systematically tune hyperparameters for each model, optimizing for recall score to prioritize the detection of true failures. The dataset was split into 80% training and 20% testing sets for robust evaluation.  </a:t>
+            </a:r>
           </a:p>
         </p:txBody>
       </p:sp>
@@ -9069,7 +9072,7 @@
                 <a:ea typeface="Arial" charset="0"/>
                 <a:cs typeface="Arial" charset="0"/>
               </a:rPr>
-              <a:t>, and k-NN.</a:t>
+              <a:t>, and the Bagging classifier.</a:t>
             </a:r>
             <a:endParaRPr kumimoji="0" lang="en-US" sz="3600" b="0" i="0" u="none" strike="noStrike" kern="1200" cap="none" spc="0" normalizeH="0" baseline="0" noProof="0" dirty="0">
               <a:ln>

</xml_diff>